<commit_message>
updated slides for sptechcon devdays
</commit_message>
<xml_diff>
--- a/pres-nodeintro-o365sp-dev.pptx
+++ b/pres-nodeintro-o365sp-dev.pptx
@@ -8715,7 +8715,7 @@
           <a:p>
             <a:fld id="{38EEC551-8CDA-4EB6-89BB-2A86C9F091C8}" type="datetime8">
               <a:rPr lang="en-US" smtClean="0"/>
-              <a:t>6/18/15 12:13 PM</a:t>
+              <a:t>6/18/15 12:27 PM</a:t>
             </a:fld>
             <a:endParaRPr lang="en-US" dirty="0"/>
           </a:p>
@@ -16220,7 +16220,7 @@
               <a:buFont typeface="Wingdings" panose="05000000000000000000" pitchFamily="2" charset="2"/>
               <a:buChar char="Ø"/>
             </a:pPr>
-            <a:endParaRPr lang="en-US" sz="1000" dirty="0" smtClean="0">
+            <a:endParaRPr lang="en-US" sz="1000" dirty="0">
               <a:gradFill>
                 <a:gsLst>
                   <a:gs pos="0">
@@ -16252,25 +16252,6 @@
               <a:buChar char="Ø"/>
             </a:pPr>
             <a:r>
-              <a:rPr lang="en-US" sz="2000" dirty="0" smtClean="0">
-                <a:gradFill>
-                  <a:gsLst>
-                    <a:gs pos="0">
-                      <a:srgbClr val="FFFFFF"/>
-                    </a:gs>
-                    <a:gs pos="100000">
-                      <a:srgbClr val="FFFFFF"/>
-                    </a:gs>
-                  </a:gsLst>
-                  <a:lin ang="5400000" scaled="0"/>
-                </a:gradFill>
-                <a:latin typeface="Segoe UI" panose="020B0502040204020203" pitchFamily="34" charset="0"/>
-                <a:ea typeface="Segoe UI" panose="020B0502040204020203" pitchFamily="34" charset="0"/>
-                <a:cs typeface="Segoe UI" panose="020B0502040204020203" pitchFamily="34" charset="0"/>
-              </a:rPr>
-              <a:t>Co-host</a:t>
-            </a:r>
-            <a:r>
               <a:rPr lang="en-US" sz="2000" dirty="0">
                 <a:gradFill>
                   <a:gsLst>
@@ -16287,10 +16268,48 @@
                 <a:ea typeface="Segoe UI" panose="020B0502040204020203" pitchFamily="34" charset="0"/>
                 <a:cs typeface="Segoe UI" panose="020B0502040204020203" pitchFamily="34" charset="0"/>
               </a:rPr>
-              <a:t>, Microsoft Cloud Show – </a:t>
-            </a:r>
-            <a:r>
-              <a:rPr lang="en-US" sz="2000" b="1" dirty="0" smtClean="0">
+              <a:t>Co-host, </a:t>
+            </a:r>
+            <a:r>
+              <a:rPr lang="en-US" sz="2000" b="1" dirty="0">
+                <a:gradFill>
+                  <a:gsLst>
+                    <a:gs pos="0">
+                      <a:srgbClr val="FFFFFF"/>
+                    </a:gs>
+                    <a:gs pos="100000">
+                      <a:srgbClr val="FFFFFF"/>
+                    </a:gs>
+                  </a:gsLst>
+                  <a:lin ang="5400000" scaled="0"/>
+                </a:gradFill>
+                <a:latin typeface="Segoe UI" panose="020B0502040204020203" pitchFamily="34" charset="0"/>
+                <a:ea typeface="Segoe UI" panose="020B0502040204020203" pitchFamily="34" charset="0"/>
+                <a:cs typeface="Segoe UI" panose="020B0502040204020203" pitchFamily="34" charset="0"/>
+              </a:rPr>
+              <a:t>Microsoft Cloud Show </a:t>
+            </a:r>
+            <a:r>
+              <a:rPr lang="en-US" sz="2000" dirty="0">
+                <a:gradFill>
+                  <a:gsLst>
+                    <a:gs pos="0">
+                      <a:srgbClr val="FFFFFF"/>
+                    </a:gs>
+                    <a:gs pos="100000">
+                      <a:srgbClr val="FFFFFF"/>
+                    </a:gs>
+                  </a:gsLst>
+                  <a:lin ang="5400000" scaled="0"/>
+                </a:gradFill>
+                <a:latin typeface="Segoe UI" panose="020B0502040204020203" pitchFamily="34" charset="0"/>
+                <a:ea typeface="Segoe UI" panose="020B0502040204020203" pitchFamily="34" charset="0"/>
+                <a:cs typeface="Segoe UI" panose="020B0502040204020203" pitchFamily="34" charset="0"/>
+              </a:rPr>
+              <a:t>– </a:t>
+            </a:r>
+            <a:r>
+              <a:rPr lang="en-US" sz="2000" b="1" dirty="0">
                 <a:gradFill>
                   <a:gsLst>
                     <a:gs pos="0">
@@ -16310,7 +16329,7 @@
               <a:t>www.MicrosoftCloudShow.com</a:t>
             </a:r>
             <a:r>
-              <a:rPr lang="en-US" sz="2000" dirty="0" smtClean="0">
+              <a:rPr lang="en-US" sz="2000" dirty="0">
                 <a:gradFill>
                   <a:gsLst>
                     <a:gs pos="0">
@@ -16328,22 +16347,6 @@
               </a:rPr>
               <a:t> </a:t>
             </a:r>
-            <a:endParaRPr lang="en-US" sz="2000" dirty="0">
-              <a:gradFill>
-                <a:gsLst>
-                  <a:gs pos="0">
-                    <a:srgbClr val="FFFFFF"/>
-                  </a:gs>
-                  <a:gs pos="100000">
-                    <a:srgbClr val="FFFFFF"/>
-                  </a:gs>
-                </a:gsLst>
-                <a:lin ang="5400000" scaled="0"/>
-              </a:gradFill>
-              <a:latin typeface="Segoe UI" panose="020B0502040204020203" pitchFamily="34" charset="0"/>
-              <a:ea typeface="Segoe UI" panose="020B0502040204020203" pitchFamily="34" charset="0"/>
-              <a:cs typeface="Segoe UI" panose="020B0502040204020203" pitchFamily="34" charset="0"/>
-            </a:endParaRPr>
           </a:p>
           <a:p>
             <a:pPr marL="285750" indent="-285750" defTabSz="932472" fontAlgn="base">
@@ -16516,7 +16519,7 @@
               <a:buFont typeface="Wingdings" panose="05000000000000000000" pitchFamily="2" charset="2"/>
               <a:buChar char="Ø"/>
             </a:pPr>
-            <a:endParaRPr lang="en-US" sz="1000" dirty="0" smtClean="0">
+            <a:endParaRPr lang="en-US" sz="1000" dirty="0">
               <a:gradFill>
                 <a:gsLst>
                   <a:gs pos="0">
@@ -16548,25 +16551,6 @@
               <a:buChar char="Ø"/>
             </a:pPr>
             <a:r>
-              <a:rPr lang="en-US" sz="2000" dirty="0" smtClean="0">
-                <a:gradFill>
-                  <a:gsLst>
-                    <a:gs pos="0">
-                      <a:srgbClr val="FFFFFF"/>
-                    </a:gs>
-                    <a:gs pos="100000">
-                      <a:srgbClr val="FFFFFF"/>
-                    </a:gs>
-                  </a:gsLst>
-                  <a:lin ang="5400000" scaled="0"/>
-                </a:gradFill>
-                <a:latin typeface="Segoe UI" panose="020B0502040204020203" pitchFamily="34" charset="0"/>
-                <a:ea typeface="Segoe UI" panose="020B0502040204020203" pitchFamily="34" charset="0"/>
-                <a:cs typeface="Segoe UI" panose="020B0502040204020203" pitchFamily="34" charset="0"/>
-              </a:rPr>
-              <a:t>On-Demand </a:t>
-            </a:r>
-            <a:r>
               <a:rPr lang="en-US" sz="2000" dirty="0">
                 <a:gradFill>
                   <a:gsLst>
@@ -16583,7 +16567,7 @@
                 <a:ea typeface="Segoe UI" panose="020B0502040204020203" pitchFamily="34" charset="0"/>
                 <a:cs typeface="Segoe UI" panose="020B0502040204020203" pitchFamily="34" charset="0"/>
               </a:rPr>
-              <a:t>SharePoint Training</a:t>
+              <a:t>On-Demand SharePoint Training</a:t>
             </a:r>
             <a:br>
               <a:rPr lang="en-US" sz="2000" dirty="0">

</xml_diff>

<commit_message>
updated to remove io.js now that convergence is done
</commit_message>
<xml_diff>
--- a/pres-nodeintro-o365sp-dev.pptx
+++ b/pres-nodeintro-o365sp-dev.pptx
@@ -5,10 +5,10 @@
     <p:sldMasterId id="2147483660" r:id="rId1"/>
   </p:sldMasterIdLst>
   <p:notesMasterIdLst>
-    <p:notesMasterId r:id="rId20"/>
+    <p:notesMasterId r:id="rId18"/>
   </p:notesMasterIdLst>
   <p:handoutMasterIdLst>
-    <p:handoutMasterId r:id="rId21"/>
+    <p:handoutMasterId r:id="rId19"/>
   </p:handoutMasterIdLst>
   <p:sldIdLst>
     <p:sldId id="256" r:id="rId2"/>
@@ -18,17 +18,15 @@
     <p:sldId id="267" r:id="rId6"/>
     <p:sldId id="268" r:id="rId7"/>
     <p:sldId id="269" r:id="rId8"/>
-    <p:sldId id="270" r:id="rId9"/>
-    <p:sldId id="271" r:id="rId10"/>
-    <p:sldId id="272" r:id="rId11"/>
-    <p:sldId id="273" r:id="rId12"/>
-    <p:sldId id="274" r:id="rId13"/>
-    <p:sldId id="275" r:id="rId14"/>
-    <p:sldId id="276" r:id="rId15"/>
-    <p:sldId id="277" r:id="rId16"/>
-    <p:sldId id="278" r:id="rId17"/>
-    <p:sldId id="279" r:id="rId18"/>
-    <p:sldId id="280" r:id="rId19"/>
+    <p:sldId id="272" r:id="rId9"/>
+    <p:sldId id="273" r:id="rId10"/>
+    <p:sldId id="274" r:id="rId11"/>
+    <p:sldId id="275" r:id="rId12"/>
+    <p:sldId id="276" r:id="rId13"/>
+    <p:sldId id="277" r:id="rId14"/>
+    <p:sldId id="278" r:id="rId15"/>
+    <p:sldId id="279" r:id="rId16"/>
+    <p:sldId id="280" r:id="rId17"/>
   </p:sldIdLst>
   <p:sldSz cx="12192000" cy="6858000"/>
   <p:notesSz cx="6858000" cy="9144000"/>
@@ -143,8 +141,6 @@
             <p14:sldId id="267"/>
             <p14:sldId id="268"/>
             <p14:sldId id="269"/>
-            <p14:sldId id="270"/>
-            <p14:sldId id="271"/>
             <p14:sldId id="272"/>
           </p14:sldIdLst>
         </p14:section>
@@ -8163,7 +8159,7 @@
           <a:p>
             <a:fld id="{1B94432C-314F-49E0-BCF5-1DF451204E4D}" type="datetimeFigureOut">
               <a:rPr lang="en-US" smtClean="0"/>
-              <a:t>6/18/15</a:t>
+              <a:t>10/6/15</a:t>
             </a:fld>
             <a:endParaRPr lang="en-US"/>
           </a:p>
@@ -8328,7 +8324,7 @@
           <a:p>
             <a:fld id="{4919CEFB-A65A-48DF-BB74-7C5EA2C86EF7}" type="datetimeFigureOut">
               <a:rPr lang="en-US" smtClean="0"/>
-              <a:t>6/18/15</a:t>
+              <a:t>10/6/15</a:t>
             </a:fld>
             <a:endParaRPr lang="en-US"/>
           </a:p>
@@ -8565,207 +8561,6 @@
 </p:notesMaster>
 </file>
 
-<file path=ppt/notesSlides/notesSlide1.xml><?xml version="1.0" encoding="utf-8"?>
-<p:notes xmlns:a="http://schemas.openxmlformats.org/drawingml/2006/main" xmlns:r="http://schemas.openxmlformats.org/officeDocument/2006/relationships" xmlns:p="http://schemas.openxmlformats.org/presentationml/2006/main">
-  <p:cSld>
-    <p:spTree>
-      <p:nvGrpSpPr>
-        <p:cNvPr id="1" name=""/>
-        <p:cNvGrpSpPr/>
-        <p:nvPr/>
-      </p:nvGrpSpPr>
-      <p:grpSpPr>
-        <a:xfrm>
-          <a:off x="0" y="0"/>
-          <a:ext cx="0" cy="0"/>
-          <a:chOff x="0" y="0"/>
-          <a:chExt cx="0" cy="0"/>
-        </a:xfrm>
-      </p:grpSpPr>
-      <p:sp>
-        <p:nvSpPr>
-          <p:cNvPr id="2" name="Slide Image Placeholder 1"/>
-          <p:cNvSpPr>
-            <a:spLocks noGrp="1" noRot="1" noChangeAspect="1"/>
-          </p:cNvSpPr>
-          <p:nvPr>
-            <p:ph type="sldImg"/>
-          </p:nvPr>
-        </p:nvSpPr>
-        <p:spPr/>
-      </p:sp>
-      <p:sp>
-        <p:nvSpPr>
-          <p:cNvPr id="3" name="Notes Placeholder 2"/>
-          <p:cNvSpPr>
-            <a:spLocks noGrp="1"/>
-          </p:cNvSpPr>
-          <p:nvPr>
-            <p:ph type="body" idx="1"/>
-          </p:nvPr>
-        </p:nvSpPr>
-        <p:spPr/>
-        <p:txBody>
-          <a:bodyPr/>
-          <a:lstStyle/>
-          <a:p>
-            <a:endParaRPr lang="en-US" dirty="0"/>
-          </a:p>
-        </p:txBody>
-      </p:sp>
-      <p:sp>
-        <p:nvSpPr>
-          <p:cNvPr id="4" name="Header Placeholder 3"/>
-          <p:cNvSpPr>
-            <a:spLocks noGrp="1"/>
-          </p:cNvSpPr>
-          <p:nvPr>
-            <p:ph type="hdr" sz="quarter" idx="10"/>
-          </p:nvPr>
-        </p:nvSpPr>
-        <p:spPr/>
-        <p:txBody>
-          <a:bodyPr/>
-          <a:lstStyle/>
-          <a:p>
-            <a:r>
-              <a:rPr lang="en-US" smtClean="0"/>
-              <a:t>Microsoft Ignite 2015</a:t>
-            </a:r>
-            <a:endParaRPr lang="en-US" dirty="0" smtClean="0"/>
-          </a:p>
-        </p:txBody>
-      </p:sp>
-      <p:sp>
-        <p:nvSpPr>
-          <p:cNvPr id="5" name="Footer Placeholder 4"/>
-          <p:cNvSpPr>
-            <a:spLocks noGrp="1"/>
-          </p:cNvSpPr>
-          <p:nvPr>
-            <p:ph type="ftr" sz="quarter" idx="11"/>
-          </p:nvPr>
-        </p:nvSpPr>
-        <p:spPr>
-          <a:xfrm>
-            <a:off x="0" y="8685213"/>
-            <a:ext cx="6172200" cy="457200"/>
-          </a:xfrm>
-          <a:prstGeom prst="rect">
-            <a:avLst/>
-          </a:prstGeom>
-        </p:spPr>
-        <p:txBody>
-          <a:bodyPr/>
-          <a:lstStyle/>
-          <a:p>
-            <a:pPr defTabSz="914099" eaLnBrk="0" hangingPunct="0"/>
-            <a:r>
-              <a:rPr lang="en-US" sz="400" smtClean="0">
-                <a:gradFill>
-                  <a:gsLst>
-                    <a:gs pos="0">
-                      <a:prstClr val="black"/>
-                    </a:gs>
-                    <a:gs pos="100000">
-                      <a:prstClr val="black"/>
-                    </a:gs>
-                  </a:gsLst>
-                  <a:lin ang="5400000" scaled="0"/>
-                </a:gradFill>
-                <a:latin typeface="Segoe UI" pitchFamily="34" charset="0"/>
-                <a:ea typeface="Segoe UI" pitchFamily="34" charset="0"/>
-                <a:cs typeface="Segoe UI" pitchFamily="34" charset="0"/>
-              </a:rPr>
-              <a:t>© 2015 Microsoft Corporation. All rights reserved. MICROSOFT MAKES NO WARRANTIES, EXPRESS, IMPLIED OR STATUTORY, AS TO THE INFORMATION IN THIS PRESENTATION.</a:t>
-            </a:r>
-            <a:endParaRPr lang="en-US" sz="400" dirty="0" smtClean="0">
-              <a:gradFill>
-                <a:gsLst>
-                  <a:gs pos="0">
-                    <a:prstClr val="black"/>
-                  </a:gs>
-                  <a:gs pos="100000">
-                    <a:prstClr val="black"/>
-                  </a:gs>
-                </a:gsLst>
-                <a:lin ang="5400000" scaled="0"/>
-              </a:gradFill>
-              <a:latin typeface="Segoe UI" pitchFamily="34" charset="0"/>
-              <a:ea typeface="Segoe UI" pitchFamily="34" charset="0"/>
-              <a:cs typeface="Segoe UI" pitchFamily="34" charset="0"/>
-            </a:endParaRPr>
-          </a:p>
-        </p:txBody>
-      </p:sp>
-      <p:sp>
-        <p:nvSpPr>
-          <p:cNvPr id="6" name="Date Placeholder 5"/>
-          <p:cNvSpPr>
-            <a:spLocks noGrp="1"/>
-          </p:cNvSpPr>
-          <p:nvPr>
-            <p:ph type="dt" idx="12"/>
-          </p:nvPr>
-        </p:nvSpPr>
-        <p:spPr/>
-        <p:txBody>
-          <a:bodyPr/>
-          <a:lstStyle/>
-          <a:p>
-            <a:fld id="{38EEC551-8CDA-4EB6-89BB-2A86C9F091C8}" type="datetime8">
-              <a:rPr lang="en-US" smtClean="0"/>
-              <a:t>6/18/15 12:27 PM</a:t>
-            </a:fld>
-            <a:endParaRPr lang="en-US" dirty="0"/>
-          </a:p>
-        </p:txBody>
-      </p:sp>
-      <p:sp>
-        <p:nvSpPr>
-          <p:cNvPr id="7" name="Slide Number Placeholder 6"/>
-          <p:cNvSpPr>
-            <a:spLocks noGrp="1"/>
-          </p:cNvSpPr>
-          <p:nvPr>
-            <p:ph type="sldNum" sz="quarter" idx="13"/>
-          </p:nvPr>
-        </p:nvSpPr>
-        <p:spPr>
-          <a:xfrm>
-            <a:off x="6172199" y="8685213"/>
-            <a:ext cx="684213" cy="457200"/>
-          </a:xfrm>
-          <a:prstGeom prst="rect">
-            <a:avLst/>
-          </a:prstGeom>
-        </p:spPr>
-        <p:txBody>
-          <a:bodyPr/>
-          <a:lstStyle/>
-          <a:p>
-            <a:fld id="{B4008EB6-D09E-4580-8CD6-DDB14511944F}" type="slidenum">
-              <a:rPr lang="en-US" smtClean="0"/>
-              <a:pPr/>
-              <a:t>9</a:t>
-            </a:fld>
-            <a:endParaRPr lang="en-US" dirty="0"/>
-          </a:p>
-        </p:txBody>
-      </p:sp>
-    </p:spTree>
-    <p:extLst>
-      <p:ext uri="{BB962C8B-B14F-4D97-AF65-F5344CB8AC3E}">
-        <p14:creationId xmlns:p14="http://schemas.microsoft.com/office/powerpoint/2010/main" val="752392754"/>
-      </p:ext>
-    </p:extLst>
-  </p:cSld>
-  <p:clrMapOvr>
-    <a:masterClrMapping/>
-  </p:clrMapOvr>
-</p:notes>
-</file>
-
 <file path=ppt/slideLayouts/slideLayout1.xml><?xml version="1.0" encoding="utf-8"?>
 <p:sldLayout xmlns:a="http://schemas.openxmlformats.org/drawingml/2006/main" xmlns:r="http://schemas.openxmlformats.org/officeDocument/2006/relationships" xmlns:p="http://schemas.openxmlformats.org/presentationml/2006/main" type="title" preserve="1">
   <p:cSld name="Title Slide">
@@ -8871,7 +8666,7 @@
           <a:effectLst/>
           <a:extLst>
             <a:ext uri="{91240B29-F687-4f45-9708-019B960494DF}">
-              <a14:hiddenLine xmlns="" xmlns:a14="http://schemas.microsoft.com/office/drawing/2010/main" w="9525">
+              <a14:hiddenLine xmlns:a14="http://schemas.microsoft.com/office/drawing/2010/main" xmlns="" w="9525">
                 <a:solidFill>
                   <a:srgbClr val="000000"/>
                 </a:solidFill>
@@ -11908,7 +11703,7 @@
           <a:ln/>
           <a:extLst>
             <a:ext uri="{91240B29-F687-4f45-9708-019B960494DF}">
-              <a14:hiddenLine xmlns="" xmlns:a14="http://schemas.microsoft.com/office/drawing/2010/main" w="9525">
+              <a14:hiddenLine xmlns:a14="http://schemas.microsoft.com/office/drawing/2010/main" xmlns="" w="9525">
                 <a:solidFill>
                   <a:srgbClr val="000000"/>
                 </a:solidFill>
@@ -12439,7 +12234,7 @@
           </a:ln>
           <a:extLst>
             <a:ext uri="{91240B29-F687-4f45-9708-019B960494DF}">
-              <a14:hiddenLine xmlns="" xmlns:a14="http://schemas.microsoft.com/office/drawing/2010/main" w="9525">
+              <a14:hiddenLine xmlns:a14="http://schemas.microsoft.com/office/drawing/2010/main" xmlns="" w="9525">
                 <a:solidFill>
                   <a:srgbClr val="000000"/>
                 </a:solidFill>
@@ -12733,7 +12528,7 @@
           </a:ln>
           <a:extLst>
             <a:ext uri="{91240B29-F687-4f45-9708-019B960494DF}">
-              <a14:hiddenLine xmlns="" xmlns:a14="http://schemas.microsoft.com/office/drawing/2010/main" w="9525">
+              <a14:hiddenLine xmlns:a14="http://schemas.microsoft.com/office/drawing/2010/main" xmlns="" w="9525">
                 <a:solidFill>
                   <a:srgbClr val="000000"/>
                 </a:solidFill>
@@ -13161,7 +12956,7 @@
           </a:ln>
           <a:extLst>
             <a:ext uri="{91240B29-F687-4f45-9708-019B960494DF}">
-              <a14:hiddenLine xmlns="" xmlns:a14="http://schemas.microsoft.com/office/drawing/2010/main" w="9525">
+              <a14:hiddenLine xmlns:a14="http://schemas.microsoft.com/office/drawing/2010/main" xmlns="" w="9525">
                 <a:solidFill>
                   <a:srgbClr val="000000"/>
                 </a:solidFill>
@@ -13567,7 +13362,7 @@
           <a:ln/>
           <a:extLst>
             <a:ext uri="{91240B29-F687-4f45-9708-019B960494DF}">
-              <a14:hiddenLine xmlns="" xmlns:a14="http://schemas.microsoft.com/office/drawing/2010/main" w="9525">
+              <a14:hiddenLine xmlns:a14="http://schemas.microsoft.com/office/drawing/2010/main" xmlns="" w="9525">
                 <a:solidFill>
                   <a:srgbClr val="000000"/>
                 </a:solidFill>
@@ -14639,7 +14434,7 @@
       </p:grpSpPr>
       <p:sp>
         <p:nvSpPr>
-          <p:cNvPr id="3" name="Title 2"/>
+          <p:cNvPr id="4" name="Title 3"/>
           <p:cNvSpPr>
             <a:spLocks noGrp="1"/>
           </p:cNvSpPr>
@@ -14654,7 +14449,7 @@
           <a:p>
             <a:r>
               <a:rPr lang="en-US" smtClean="0"/>
-              <a:t>Appeal of Node.js &amp; io.js</a:t>
+              <a:t>Node.js Developer Tooling Options</a:t>
             </a:r>
             <a:endParaRPr lang="en-US" dirty="0"/>
           </a:p>
@@ -14662,7 +14457,7 @@
       </p:sp>
       <p:sp>
         <p:nvSpPr>
-          <p:cNvPr id="2" name="Text Placeholder 1"/>
+          <p:cNvPr id="5" name="Text Placeholder 4"/>
           <p:cNvSpPr>
             <a:spLocks noGrp="1"/>
           </p:cNvSpPr>
@@ -14672,60 +14467,111 @@
         </p:nvSpPr>
         <p:spPr/>
         <p:txBody>
-          <a:bodyPr/>
+          <a:bodyPr>
+            <a:normAutofit fontScale="92500" lnSpcReduction="20000"/>
+          </a:bodyPr>
           <a:lstStyle/>
           <a:p>
             <a:r>
-              <a:rPr lang="en-US" smtClean="0"/>
-              <a:t>One language used from server to client</a:t>
-            </a:r>
-          </a:p>
-          <a:p>
-            <a:r>
-              <a:rPr lang="en-US" smtClean="0"/>
-              <a:t>Same language used in projects &amp; ecosystem around the projects</a:t>
+              <a:rPr lang="en-US" sz="2400" dirty="0" smtClean="0"/>
+              <a:t>Visual Studio</a:t>
             </a:r>
           </a:p>
           <a:p>
             <a:pPr lvl="1"/>
             <a:r>
-              <a:rPr lang="en-US" smtClean="0"/>
-              <a:t>Build process</a:t>
+              <a:rPr lang="en-US" sz="2400" dirty="0" smtClean="0">
+                <a:hlinkClick r:id="rId2"/>
+              </a:rPr>
+              <a:t>https://www.visualstudio.com/en-us/explore/node-js-vs</a:t>
+            </a:r>
+            <a:endParaRPr lang="en-US" sz="2400" dirty="0" smtClean="0"/>
+          </a:p>
+          <a:p>
+            <a:r>
+              <a:rPr lang="en-US" sz="2400" dirty="0" smtClean="0"/>
+              <a:t>Visual Studio Code</a:t>
             </a:r>
           </a:p>
           <a:p>
             <a:pPr lvl="1"/>
             <a:r>
-              <a:rPr lang="en-US" smtClean="0"/>
-              <a:t>Developer tooling</a:t>
-            </a:r>
+              <a:rPr lang="en-US" sz="2400" dirty="0" smtClean="0">
+                <a:hlinkClick r:id="rId3"/>
+              </a:rPr>
+              <a:t>https://code.visualstudio.com</a:t>
+            </a:r>
+            <a:r>
+              <a:rPr lang="en-US" sz="2400" dirty="0" smtClean="0"/>
+              <a:t> </a:t>
+            </a:r>
+          </a:p>
+          <a:p>
+            <a:r>
+              <a:rPr lang="en-US" sz="2400" dirty="0" err="1" smtClean="0"/>
+              <a:t>WebMatrix</a:t>
+            </a:r>
+            <a:endParaRPr lang="en-US" sz="2400" dirty="0" smtClean="0"/>
           </a:p>
           <a:p>
             <a:pPr lvl="1"/>
             <a:r>
-              <a:rPr lang="en-US" smtClean="0"/>
-              <a:t>System configuration</a:t>
+              <a:rPr lang="en-US" sz="2400" dirty="0" smtClean="0">
+                <a:hlinkClick r:id="rId4"/>
+              </a:rPr>
+              <a:t>http://www.microsoft.com/web/webmatrix</a:t>
+            </a:r>
+            <a:r>
+              <a:rPr lang="en-US" sz="2400" dirty="0" smtClean="0"/>
+              <a:t> </a:t>
             </a:r>
           </a:p>
           <a:p>
             <a:r>
-              <a:rPr lang="en-US" smtClean="0"/>
-              <a:t>Cross platform</a:t>
-            </a:r>
+              <a:rPr lang="en-US" sz="2400" dirty="0" err="1" smtClean="0"/>
+              <a:t>WebStorm</a:t>
+            </a:r>
+            <a:endParaRPr lang="en-US" sz="2400" dirty="0" smtClean="0"/>
           </a:p>
           <a:p>
-            <a:r>
-              <a:rPr lang="en-US" smtClean="0"/>
-              <a:t>Built for network &amp; I/O bound operations</a:t>
-            </a:r>
-            <a:endParaRPr lang="en-US" dirty="0"/>
+            <a:pPr lvl="1"/>
+            <a:r>
+              <a:rPr lang="en-US" sz="2400" dirty="0" smtClean="0">
+                <a:hlinkClick r:id="rId5"/>
+              </a:rPr>
+              <a:t>https://www.jetbrains.com/webstorm</a:t>
+            </a:r>
+            <a:endParaRPr lang="en-US" sz="2400" dirty="0" smtClean="0"/>
+          </a:p>
+          <a:p>
+            <a:r>
+              <a:rPr lang="en-US" sz="2400" dirty="0" smtClean="0"/>
+              <a:t>Brackets</a:t>
+            </a:r>
+          </a:p>
+          <a:p>
+            <a:pPr lvl="1"/>
+            <a:r>
+              <a:rPr lang="en-US" sz="2400" dirty="0" smtClean="0">
+                <a:hlinkClick r:id="rId6"/>
+              </a:rPr>
+              <a:t>http://brackets.io</a:t>
+            </a:r>
+            <a:endParaRPr lang="en-US" sz="2400" dirty="0" smtClean="0"/>
+          </a:p>
+          <a:p>
+            <a:r>
+              <a:rPr lang="en-US" sz="2400" dirty="0" smtClean="0"/>
+              <a:t>Any text editor</a:t>
+            </a:r>
+            <a:endParaRPr lang="en-US" sz="2400" dirty="0"/>
           </a:p>
         </p:txBody>
       </p:sp>
     </p:spTree>
     <p:extLst>
       <p:ext uri="{BB962C8B-B14F-4D97-AF65-F5344CB8AC3E}">
-        <p14:creationId xmlns:p14="http://schemas.microsoft.com/office/powerpoint/2010/main" val="1474612399"/>
+        <p14:creationId xmlns:p14="http://schemas.microsoft.com/office/powerpoint/2010/main" val="660260756"/>
       </p:ext>
     </p:extLst>
   </p:cSld>
@@ -14784,274 +14630,6 @@
           <a:p>
             <a:r>
               <a:rPr lang="en-US" smtClean="0"/>
-              <a:t>Developer Tooling for Node.js</a:t>
-            </a:r>
-            <a:endParaRPr lang="en-US" dirty="0"/>
-          </a:p>
-        </p:txBody>
-      </p:sp>
-      <p:sp>
-        <p:nvSpPr>
-          <p:cNvPr id="2" name="Text Placeholder 1"/>
-          <p:cNvSpPr>
-            <a:spLocks noGrp="1"/>
-          </p:cNvSpPr>
-          <p:nvPr>
-            <p:ph type="body" idx="1"/>
-          </p:nvPr>
-        </p:nvSpPr>
-        <p:spPr/>
-        <p:txBody>
-          <a:bodyPr/>
-          <a:lstStyle/>
-          <a:p>
-            <a:endParaRPr lang="en-US"/>
-          </a:p>
-        </p:txBody>
-      </p:sp>
-    </p:spTree>
-    <p:extLst>
-      <p:ext uri="{BB962C8B-B14F-4D97-AF65-F5344CB8AC3E}">
-        <p14:creationId xmlns:p14="http://schemas.microsoft.com/office/powerpoint/2010/main" val="1687926652"/>
-      </p:ext>
-    </p:extLst>
-  </p:cSld>
-  <p:clrMapOvr>
-    <a:masterClrMapping/>
-  </p:clrMapOvr>
-  <mc:AlternateContent xmlns:mc="http://schemas.openxmlformats.org/markup-compatibility/2006" xmlns:p14="http://schemas.microsoft.com/office/powerpoint/2010/main">
-    <mc:Choice Requires="p14">
-      <p:transition spd="slow" p14:dur="2000"/>
-    </mc:Choice>
-    <mc:Fallback xmlns="">
-      <p:transition spd="slow"/>
-    </mc:Fallback>
-  </mc:AlternateContent>
-  <p:timing>
-    <p:tnLst>
-      <p:par>
-        <p:cTn id="1" dur="indefinite" restart="never" nodeType="tmRoot"/>
-      </p:par>
-    </p:tnLst>
-  </p:timing>
-</p:sld>
-</file>
-
-<file path=ppt/slides/slide12.xml><?xml version="1.0" encoding="utf-8"?>
-<p:sld xmlns:a="http://schemas.openxmlformats.org/drawingml/2006/main" xmlns:r="http://schemas.openxmlformats.org/officeDocument/2006/relationships" xmlns:p="http://schemas.openxmlformats.org/presentationml/2006/main">
-  <p:cSld>
-    <p:spTree>
-      <p:nvGrpSpPr>
-        <p:cNvPr id="1" name=""/>
-        <p:cNvGrpSpPr/>
-        <p:nvPr/>
-      </p:nvGrpSpPr>
-      <p:grpSpPr>
-        <a:xfrm>
-          <a:off x="0" y="0"/>
-          <a:ext cx="0" cy="0"/>
-          <a:chOff x="0" y="0"/>
-          <a:chExt cx="0" cy="0"/>
-        </a:xfrm>
-      </p:grpSpPr>
-      <p:sp>
-        <p:nvSpPr>
-          <p:cNvPr id="4" name="Title 3"/>
-          <p:cNvSpPr>
-            <a:spLocks noGrp="1"/>
-          </p:cNvSpPr>
-          <p:nvPr>
-            <p:ph type="title"/>
-          </p:nvPr>
-        </p:nvSpPr>
-        <p:spPr/>
-        <p:txBody>
-          <a:bodyPr/>
-          <a:lstStyle/>
-          <a:p>
-            <a:r>
-              <a:rPr lang="en-US" smtClean="0"/>
-              <a:t>Node.js Developer Tooling Options</a:t>
-            </a:r>
-            <a:endParaRPr lang="en-US" dirty="0"/>
-          </a:p>
-        </p:txBody>
-      </p:sp>
-      <p:sp>
-        <p:nvSpPr>
-          <p:cNvPr id="5" name="Text Placeholder 4"/>
-          <p:cNvSpPr>
-            <a:spLocks noGrp="1"/>
-          </p:cNvSpPr>
-          <p:nvPr>
-            <p:ph idx="1"/>
-          </p:nvPr>
-        </p:nvSpPr>
-        <p:spPr/>
-        <p:txBody>
-          <a:bodyPr>
-            <a:normAutofit fontScale="92500" lnSpcReduction="20000"/>
-          </a:bodyPr>
-          <a:lstStyle/>
-          <a:p>
-            <a:r>
-              <a:rPr lang="en-US" sz="2400" dirty="0" smtClean="0"/>
-              <a:t>Visual Studio</a:t>
-            </a:r>
-          </a:p>
-          <a:p>
-            <a:pPr lvl="1"/>
-            <a:r>
-              <a:rPr lang="en-US" sz="2400" dirty="0" smtClean="0">
-                <a:hlinkClick r:id="rId2"/>
-              </a:rPr>
-              <a:t>https://www.visualstudio.com/en-us/explore/node-js-vs</a:t>
-            </a:r>
-            <a:endParaRPr lang="en-US" sz="2400" dirty="0" smtClean="0"/>
-          </a:p>
-          <a:p>
-            <a:r>
-              <a:rPr lang="en-US" sz="2400" dirty="0" smtClean="0"/>
-              <a:t>Visual Studio Code</a:t>
-            </a:r>
-          </a:p>
-          <a:p>
-            <a:pPr lvl="1"/>
-            <a:r>
-              <a:rPr lang="en-US" sz="2400" dirty="0" smtClean="0">
-                <a:hlinkClick r:id="rId3"/>
-              </a:rPr>
-              <a:t>https://code.visualstudio.com</a:t>
-            </a:r>
-            <a:r>
-              <a:rPr lang="en-US" sz="2400" dirty="0" smtClean="0"/>
-              <a:t> </a:t>
-            </a:r>
-          </a:p>
-          <a:p>
-            <a:r>
-              <a:rPr lang="en-US" sz="2400" dirty="0" err="1" smtClean="0"/>
-              <a:t>WebMatrix</a:t>
-            </a:r>
-            <a:endParaRPr lang="en-US" sz="2400" dirty="0" smtClean="0"/>
-          </a:p>
-          <a:p>
-            <a:pPr lvl="1"/>
-            <a:r>
-              <a:rPr lang="en-US" sz="2400" dirty="0" smtClean="0">
-                <a:hlinkClick r:id="rId4"/>
-              </a:rPr>
-              <a:t>http://www.microsoft.com/web/webmatrix</a:t>
-            </a:r>
-            <a:r>
-              <a:rPr lang="en-US" sz="2400" dirty="0" smtClean="0"/>
-              <a:t> </a:t>
-            </a:r>
-          </a:p>
-          <a:p>
-            <a:r>
-              <a:rPr lang="en-US" sz="2400" dirty="0" err="1" smtClean="0"/>
-              <a:t>WebStorm</a:t>
-            </a:r>
-            <a:endParaRPr lang="en-US" sz="2400" dirty="0" smtClean="0"/>
-          </a:p>
-          <a:p>
-            <a:pPr lvl="1"/>
-            <a:r>
-              <a:rPr lang="en-US" sz="2400" dirty="0" smtClean="0">
-                <a:hlinkClick r:id="rId5"/>
-              </a:rPr>
-              <a:t>https://www.jetbrains.com/webstorm</a:t>
-            </a:r>
-            <a:endParaRPr lang="en-US" sz="2400" dirty="0" smtClean="0"/>
-          </a:p>
-          <a:p>
-            <a:r>
-              <a:rPr lang="en-US" sz="2400" dirty="0" smtClean="0"/>
-              <a:t>Brackets</a:t>
-            </a:r>
-          </a:p>
-          <a:p>
-            <a:pPr lvl="1"/>
-            <a:r>
-              <a:rPr lang="en-US" sz="2400" dirty="0" smtClean="0">
-                <a:hlinkClick r:id="rId6"/>
-              </a:rPr>
-              <a:t>http://brackets.io</a:t>
-            </a:r>
-            <a:endParaRPr lang="en-US" sz="2400" dirty="0" smtClean="0"/>
-          </a:p>
-          <a:p>
-            <a:r>
-              <a:rPr lang="en-US" sz="2400" dirty="0" smtClean="0"/>
-              <a:t>Any text editor</a:t>
-            </a:r>
-            <a:endParaRPr lang="en-US" sz="2400" dirty="0"/>
-          </a:p>
-        </p:txBody>
-      </p:sp>
-    </p:spTree>
-    <p:extLst>
-      <p:ext uri="{BB962C8B-B14F-4D97-AF65-F5344CB8AC3E}">
-        <p14:creationId xmlns:p14="http://schemas.microsoft.com/office/powerpoint/2010/main" val="660260756"/>
-      </p:ext>
-    </p:extLst>
-  </p:cSld>
-  <p:clrMapOvr>
-    <a:masterClrMapping/>
-  </p:clrMapOvr>
-  <mc:AlternateContent xmlns:mc="http://schemas.openxmlformats.org/markup-compatibility/2006" xmlns:p14="http://schemas.microsoft.com/office/powerpoint/2010/main">
-    <mc:Choice Requires="p14">
-      <p:transition spd="slow" p14:dur="2000"/>
-    </mc:Choice>
-    <mc:Fallback xmlns="">
-      <p:transition spd="slow"/>
-    </mc:Fallback>
-  </mc:AlternateContent>
-  <p:timing>
-    <p:tnLst>
-      <p:par>
-        <p:cTn id="1" dur="indefinite" restart="never" nodeType="tmRoot"/>
-      </p:par>
-    </p:tnLst>
-  </p:timing>
-</p:sld>
-</file>
-
-<file path=ppt/slides/slide13.xml><?xml version="1.0" encoding="utf-8"?>
-<p:sld xmlns:a="http://schemas.openxmlformats.org/drawingml/2006/main" xmlns:r="http://schemas.openxmlformats.org/officeDocument/2006/relationships" xmlns:p="http://schemas.openxmlformats.org/presentationml/2006/main">
-  <p:cSld>
-    <p:spTree>
-      <p:nvGrpSpPr>
-        <p:cNvPr id="1" name=""/>
-        <p:cNvGrpSpPr/>
-        <p:nvPr/>
-      </p:nvGrpSpPr>
-      <p:grpSpPr>
-        <a:xfrm>
-          <a:off x="0" y="0"/>
-          <a:ext cx="0" cy="0"/>
-          <a:chOff x="0" y="0"/>
-          <a:chExt cx="0" cy="0"/>
-        </a:xfrm>
-      </p:grpSpPr>
-      <p:sp>
-        <p:nvSpPr>
-          <p:cNvPr id="4" name="Title 3"/>
-          <p:cNvSpPr>
-            <a:spLocks noGrp="1"/>
-          </p:cNvSpPr>
-          <p:nvPr>
-            <p:ph type="title"/>
-          </p:nvPr>
-        </p:nvSpPr>
-        <p:spPr/>
-        <p:txBody>
-          <a:bodyPr/>
-          <a:lstStyle/>
-          <a:p>
-            <a:r>
-              <a:rPr lang="en-US" smtClean="0"/>
               <a:t>Developing Node.js</a:t>
             </a:r>
             <a:endParaRPr lang="en-US" dirty="0"/>
@@ -15105,7 +14683,7 @@
 </p:sld>
 </file>
 
-<file path=ppt/slides/slide14.xml><?xml version="1.0" encoding="utf-8"?>
+<file path=ppt/slides/slide12.xml><?xml version="1.0" encoding="utf-8"?>
 <p:sld xmlns:a="http://schemas.openxmlformats.org/drawingml/2006/main" xmlns:r="http://schemas.openxmlformats.org/officeDocument/2006/relationships" xmlns:p="http://schemas.openxmlformats.org/presentationml/2006/main">
   <p:cSld>
     <p:spTree>
@@ -15195,7 +14773,7 @@
 </p:sld>
 </file>
 
-<file path=ppt/slides/slide15.xml><?xml version="1.0" encoding="utf-8"?>
+<file path=ppt/slides/slide13.xml><?xml version="1.0" encoding="utf-8"?>
 <p:sld xmlns:a="http://schemas.openxmlformats.org/drawingml/2006/main" xmlns:r="http://schemas.openxmlformats.org/officeDocument/2006/relationships" xmlns:p="http://schemas.openxmlformats.org/presentationml/2006/main">
   <p:cSld>
     <p:spTree>
@@ -15310,7 +14888,7 @@
 </p:sld>
 </file>
 
-<file path=ppt/slides/slide16.xml><?xml version="1.0" encoding="utf-8"?>
+<file path=ppt/slides/slide14.xml><?xml version="1.0" encoding="utf-8"?>
 <p:sld xmlns:a="http://schemas.openxmlformats.org/drawingml/2006/main" xmlns:r="http://schemas.openxmlformats.org/officeDocument/2006/relationships" xmlns:p="http://schemas.openxmlformats.org/presentationml/2006/main">
   <p:cSld>
     <p:spTree>
@@ -15447,7 +15025,7 @@
 </p:sld>
 </file>
 
-<file path=ppt/slides/slide17.xml><?xml version="1.0" encoding="utf-8"?>
+<file path=ppt/slides/slide15.xml><?xml version="1.0" encoding="utf-8"?>
 <p:sld xmlns:a="http://schemas.openxmlformats.org/drawingml/2006/main" xmlns:r="http://schemas.openxmlformats.org/officeDocument/2006/relationships" xmlns:p="http://schemas.openxmlformats.org/presentationml/2006/main">
   <p:cSld>
     <p:spTree>
@@ -15533,7 +15111,7 @@
 </p:sld>
 </file>
 
-<file path=ppt/slides/slide18.xml><?xml version="1.0" encoding="utf-8"?>
+<file path=ppt/slides/slide16.xml><?xml version="1.0" encoding="utf-8"?>
 <p:sld xmlns:a="http://schemas.openxmlformats.org/drawingml/2006/main" xmlns:r="http://schemas.openxmlformats.org/officeDocument/2006/relationships" xmlns:p="http://schemas.openxmlformats.org/presentationml/2006/main">
   <p:cSld>
     <p:spTree>
@@ -16732,31 +16310,55 @@
           <a:lstStyle/>
           <a:p>
             <a:r>
-              <a:rPr lang="en-US" smtClean="0"/>
-              <a:t>What is Node.js? … and io.js?</a:t>
-            </a:r>
+              <a:rPr lang="en-US" dirty="0" smtClean="0"/>
+              <a:t>What is </a:t>
+            </a:r>
+            <a:r>
+              <a:rPr lang="en-US" dirty="0" err="1" smtClean="0"/>
+              <a:t>Node.js</a:t>
+            </a:r>
+            <a:r>
+              <a:rPr lang="en-US" dirty="0" smtClean="0"/>
+              <a:t>?</a:t>
+            </a:r>
+            <a:endParaRPr lang="en-US" dirty="0" smtClean="0"/>
           </a:p>
           <a:p>
             <a:r>
-              <a:rPr lang="en-US" smtClean="0"/>
-              <a:t>Developer Tooling for Node.js</a:t>
-            </a:r>
+              <a:rPr lang="en-US" dirty="0" smtClean="0"/>
+              <a:t>Developer Tooling for </a:t>
+            </a:r>
+            <a:r>
+              <a:rPr lang="en-US" dirty="0" err="1" smtClean="0"/>
+              <a:t>Node.js</a:t>
+            </a:r>
+            <a:endParaRPr lang="en-US" dirty="0" smtClean="0"/>
           </a:p>
           <a:p>
             <a:r>
-              <a:rPr lang="en-US" smtClean="0"/>
-              <a:t>Creating Websites &amp; Web APIs with Node.js</a:t>
-            </a:r>
+              <a:rPr lang="en-US" dirty="0" smtClean="0"/>
+              <a:t>Creating Websites &amp; Web APIs with </a:t>
+            </a:r>
+            <a:r>
+              <a:rPr lang="en-US" dirty="0" err="1" smtClean="0"/>
+              <a:t>Node.js</a:t>
+            </a:r>
+            <a:endParaRPr lang="en-US" dirty="0" smtClean="0"/>
           </a:p>
           <a:p>
             <a:r>
-              <a:rPr lang="en-US" smtClean="0"/>
-              <a:t>Developing with Node.js</a:t>
-            </a:r>
+              <a:rPr lang="en-US" dirty="0" smtClean="0"/>
+              <a:t>Developing with </a:t>
+            </a:r>
+            <a:r>
+              <a:rPr lang="en-US" dirty="0" err="1" smtClean="0"/>
+              <a:t>Node.js</a:t>
+            </a:r>
+            <a:endParaRPr lang="en-US" dirty="0" smtClean="0"/>
           </a:p>
           <a:p>
             <a:r>
-              <a:rPr lang="en-US" smtClean="0"/>
+              <a:rPr lang="en-US" dirty="0" smtClean="0"/>
               <a:t>Node for Office &amp; SharePoint Add-ins</a:t>
             </a:r>
             <a:endParaRPr lang="en-US" dirty="0"/>
@@ -17358,8 +16960,12 @@
           <a:lstStyle/>
           <a:p>
             <a:r>
-              <a:rPr lang="en-US" smtClean="0"/>
-              <a:t>Node.js vs io.js</a:t>
+              <a:rPr lang="en-US" dirty="0" smtClean="0"/>
+              <a:t>Appeal of </a:t>
+            </a:r>
+            <a:r>
+              <a:rPr lang="en-US" dirty="0" err="1" smtClean="0"/>
+              <a:t>Node.js</a:t>
             </a:r>
             <a:endParaRPr lang="en-US" dirty="0"/>
           </a:p>
@@ -17377,168 +16983,60 @@
         </p:nvSpPr>
         <p:spPr/>
         <p:txBody>
-          <a:bodyPr>
-            <a:normAutofit fontScale="85000" lnSpcReduction="20000"/>
-          </a:bodyPr>
+          <a:bodyPr/>
           <a:lstStyle/>
           <a:p>
             <a:r>
-              <a:rPr lang="en-US" sz="2400" dirty="0" err="1" smtClean="0"/>
-              <a:t>Node.js</a:t>
-            </a:r>
-            <a:r>
-              <a:rPr lang="en-US" sz="2400" dirty="0" smtClean="0"/>
-              <a:t> – </a:t>
-            </a:r>
-            <a:r>
-              <a:rPr lang="en-US" sz="2400" dirty="0" smtClean="0">
-                <a:hlinkClick r:id="rId2"/>
-              </a:rPr>
-              <a:t>https://nodejs.org</a:t>
-            </a:r>
-            <a:r>
-              <a:rPr lang="en-US" sz="2400" dirty="0" smtClean="0"/>
-              <a:t> </a:t>
+              <a:rPr lang="en-US" smtClean="0"/>
+              <a:t>One language used from server to client</a:t>
+            </a:r>
+          </a:p>
+          <a:p>
+            <a:r>
+              <a:rPr lang="en-US" smtClean="0"/>
+              <a:t>Same language used in projects &amp; ecosystem around the projects</a:t>
             </a:r>
           </a:p>
           <a:p>
             <a:pPr lvl="1"/>
             <a:r>
-              <a:rPr lang="en-US" sz="2400" dirty="0" smtClean="0"/>
-              <a:t>Managed by </a:t>
-            </a:r>
-            <a:r>
-              <a:rPr lang="en-US" sz="2400" dirty="0" err="1" smtClean="0"/>
-              <a:t>Node.js</a:t>
-            </a:r>
-            <a:r>
-              <a:rPr lang="en-US" sz="2400" dirty="0" smtClean="0"/>
-              <a:t> Foundation (+</a:t>
-            </a:r>
-            <a:r>
-              <a:rPr lang="en-US" sz="2400" dirty="0" err="1" smtClean="0"/>
-              <a:t>Joyent</a:t>
-            </a:r>
-            <a:r>
-              <a:rPr lang="en-US" sz="2400" dirty="0" smtClean="0"/>
-              <a:t>)</a:t>
+              <a:rPr lang="en-US" smtClean="0"/>
+              <a:t>Build process</a:t>
             </a:r>
           </a:p>
           <a:p>
             <a:pPr lvl="1"/>
             <a:r>
-              <a:rPr lang="en-US" sz="2400" dirty="0" smtClean="0"/>
-              <a:t>Current (v0.12.2) uses V8 v3.28.73</a:t>
-            </a:r>
-          </a:p>
-          <a:p>
-            <a:r>
-              <a:rPr lang="en-US" sz="2400" dirty="0" err="1" smtClean="0"/>
-              <a:t>io.js</a:t>
-            </a:r>
-            <a:r>
-              <a:rPr lang="en-US" sz="2400" dirty="0" smtClean="0"/>
-              <a:t> - </a:t>
-            </a:r>
-            <a:r>
-              <a:rPr lang="en-US" sz="2400" dirty="0" smtClean="0">
-                <a:hlinkClick r:id="rId3"/>
-              </a:rPr>
-              <a:t>https://iojs.org</a:t>
-            </a:r>
-            <a:endParaRPr lang="en-US" sz="2400" dirty="0" smtClean="0"/>
+              <a:rPr lang="en-US" smtClean="0"/>
+              <a:t>Developer tooling</a:t>
+            </a:r>
           </a:p>
           <a:p>
             <a:pPr lvl="1"/>
             <a:r>
-              <a:rPr lang="en-US" sz="2400" dirty="0" smtClean="0"/>
-              <a:t>Forked copy of </a:t>
-            </a:r>
-            <a:r>
-              <a:rPr lang="en-US" sz="2400" dirty="0" err="1" smtClean="0"/>
-              <a:t>Node.js</a:t>
-            </a:r>
-            <a:r>
-              <a:rPr lang="en-US" sz="2400" dirty="0" smtClean="0"/>
-              <a:t> in late 2014</a:t>
+              <a:rPr lang="en-US" smtClean="0"/>
+              <a:t>System configuration</a:t>
             </a:r>
           </a:p>
           <a:p>
-            <a:pPr lvl="1"/>
-            <a:r>
-              <a:rPr lang="en-US" sz="2400" dirty="0" smtClean="0"/>
-              <a:t>Created out of community frustrations with decline in the pace of </a:t>
-            </a:r>
-            <a:br>
-              <a:rPr lang="en-US" sz="2400" dirty="0" smtClean="0"/>
-            </a:br>
-            <a:r>
-              <a:rPr lang="en-US" sz="2400" dirty="0" smtClean="0"/>
-              <a:t>contributions &amp; releases - </a:t>
-            </a:r>
-            <a:r>
-              <a:rPr lang="en-US" sz="2400" dirty="0" smtClean="0">
-                <a:hlinkClick r:id="rId4"/>
-              </a:rPr>
-              <a:t>http://aconn.me/1NZQvHl</a:t>
-            </a:r>
-            <a:r>
-              <a:rPr lang="en-US" sz="2400" dirty="0" smtClean="0"/>
-              <a:t> </a:t>
+            <a:r>
+              <a:rPr lang="en-US" smtClean="0"/>
+              <a:t>Cross platform</a:t>
             </a:r>
           </a:p>
           <a:p>
-            <a:pPr lvl="1"/>
-            <a:r>
-              <a:rPr lang="en-US" sz="2400" dirty="0" smtClean="0"/>
-              <a:t>Current version (v2.0.0) uses V8 v4.2</a:t>
-            </a:r>
-          </a:p>
-          <a:p>
-            <a:pPr lvl="1"/>
-            <a:r>
-              <a:rPr lang="en-US" sz="2400" dirty="0" smtClean="0"/>
-              <a:t>Contains many fixes &amp; features not yet implemented in </a:t>
-            </a:r>
-            <a:r>
-              <a:rPr lang="en-US" sz="2400" dirty="0" err="1" smtClean="0"/>
-              <a:t>Node.js</a:t>
-            </a:r>
-            <a:endParaRPr lang="en-US" sz="2400" dirty="0" smtClean="0"/>
-          </a:p>
-          <a:p>
-            <a:pPr lvl="1"/>
-            <a:r>
-              <a:rPr lang="en-US" sz="2400" dirty="0" smtClean="0"/>
-              <a:t>Compatible with NPM</a:t>
-            </a:r>
-          </a:p>
-          <a:p>
-            <a:r>
-              <a:rPr lang="en-US" sz="2400" dirty="0" smtClean="0"/>
-              <a:t>What will the future hold?</a:t>
-            </a:r>
-          </a:p>
-          <a:p>
-            <a:pPr lvl="1"/>
-            <a:r>
-              <a:rPr lang="en-US" sz="2400" dirty="0" smtClean="0">
-                <a:hlinkClick r:id="rId5"/>
-              </a:rPr>
-              <a:t>https://github.com/nodejs/dev-policy</a:t>
-            </a:r>
-            <a:r>
-              <a:rPr lang="en-US" sz="2400" dirty="0" smtClean="0"/>
-              <a:t> </a:t>
-            </a:r>
-            <a:endParaRPr lang="en-US" sz="2400" dirty="0"/>
+            <a:r>
+              <a:rPr lang="en-US" smtClean="0"/>
+              <a:t>Built for network &amp; I/O bound operations</a:t>
+            </a:r>
+            <a:endParaRPr lang="en-US" dirty="0"/>
           </a:p>
         </p:txBody>
       </p:sp>
     </p:spTree>
     <p:extLst>
       <p:ext uri="{BB962C8B-B14F-4D97-AF65-F5344CB8AC3E}">
-        <p14:creationId xmlns:p14="http://schemas.microsoft.com/office/powerpoint/2010/main" val="491705403"/>
+        <p14:creationId xmlns:p14="http://schemas.microsoft.com/office/powerpoint/2010/main" val="1474612399"/>
       </p:ext>
     </p:extLst>
   </p:cSld>
@@ -17580,202 +17078,52 @@
           <a:chExt cx="0" cy="0"/>
         </a:xfrm>
       </p:grpSpPr>
-      <p:pic>
-        <p:nvPicPr>
-          <p:cNvPr id="4" name="Picture 3" descr="nodejs-activity.png"/>
-          <p:cNvPicPr>
-            <a:picLocks noChangeAspect="1"/>
-          </p:cNvPicPr>
-          <p:nvPr/>
-        </p:nvPicPr>
-        <p:blipFill>
-          <a:blip r:embed="rId3">
-            <a:extLst>
-              <a:ext uri="{28A0092B-C50C-407E-A947-70E740481C1C}">
-                <a14:useLocalDpi xmlns:a14="http://schemas.microsoft.com/office/drawing/2010/main" val="0"/>
-              </a:ext>
-            </a:extLst>
-          </a:blip>
-          <a:stretch>
-            <a:fillRect/>
-          </a:stretch>
-        </p:blipFill>
-        <p:spPr>
-          <a:xfrm>
-            <a:off x="1546989" y="1324504"/>
-            <a:ext cx="9092841" cy="4175099"/>
-          </a:xfrm>
-          <a:prstGeom prst="rect">
-            <a:avLst/>
-          </a:prstGeom>
-          <a:ln>
-            <a:solidFill>
-              <a:srgbClr val="000000"/>
-            </a:solidFill>
-          </a:ln>
-        </p:spPr>
-      </p:pic>
       <p:sp>
         <p:nvSpPr>
-          <p:cNvPr id="5" name="Alternate Process 4"/>
-          <p:cNvSpPr/>
-          <p:nvPr/>
+          <p:cNvPr id="4" name="Title 3"/>
+          <p:cNvSpPr>
+            <a:spLocks noGrp="1"/>
+          </p:cNvSpPr>
+          <p:nvPr>
+            <p:ph type="title"/>
+          </p:nvPr>
         </p:nvSpPr>
-        <p:spPr bwMode="auto">
-          <a:xfrm>
-            <a:off x="7384611" y="3877212"/>
-            <a:ext cx="2409142" cy="1400664"/>
-          </a:xfrm>
-          <a:prstGeom prst="flowChartAlternateProcess">
-            <a:avLst/>
-          </a:prstGeom>
-          <a:noFill/>
-          <a:ln w="38100">
-            <a:solidFill>
-              <a:srgbClr val="FF0000"/>
-            </a:solidFill>
-            <a:headEnd type="none" w="med" len="med"/>
-            <a:tailEnd type="none" w="med" len="med"/>
-          </a:ln>
-          <a:effectLst/>
-        </p:spPr>
-        <p:style>
-          <a:lnRef idx="1">
-            <a:schemeClr val="accent2"/>
-          </a:lnRef>
-          <a:fillRef idx="3">
-            <a:schemeClr val="accent2"/>
-          </a:fillRef>
-          <a:effectRef idx="2">
-            <a:schemeClr val="accent2"/>
-          </a:effectRef>
-          <a:fontRef idx="minor">
-            <a:schemeClr val="lt1"/>
-          </a:fontRef>
-        </p:style>
+        <p:spPr/>
         <p:txBody>
-          <a:bodyPr lIns="67232" tIns="67232" rIns="25215" bIns="25215" rtlCol="0" anchor="b" anchorCtr="0"/>
+          <a:bodyPr/>
           <a:lstStyle/>
           <a:p>
-            <a:pPr algn="ctr" defTabSz="685598"/>
-            <a:endParaRPr lang="en-US" sz="588" dirty="0">
-              <a:gradFill>
-                <a:gsLst>
-                  <a:gs pos="0">
-                    <a:srgbClr val="FFFFFF"/>
-                  </a:gs>
-                  <a:gs pos="100000">
-                    <a:srgbClr val="FFFFFF"/>
-                  </a:gs>
-                </a:gsLst>
-                <a:lin ang="5400000" scaled="0"/>
-              </a:gradFill>
-              <a:ea typeface="Segoe UI" pitchFamily="34" charset="0"/>
-              <a:cs typeface="Segoe UI" pitchFamily="34" charset="0"/>
-            </a:endParaRPr>
+            <a:r>
+              <a:rPr lang="en-US" smtClean="0"/>
+              <a:t>Developer Tooling for Node.js</a:t>
+            </a:r>
+            <a:endParaRPr lang="en-US" dirty="0"/>
           </a:p>
         </p:txBody>
       </p:sp>
-      <p:pic>
-        <p:nvPicPr>
-          <p:cNvPr id="7" name="Picture 6" descr="iojs-activity.png"/>
-          <p:cNvPicPr>
-            <a:picLocks noChangeAspect="1"/>
-          </p:cNvPicPr>
-          <p:nvPr/>
-        </p:nvPicPr>
-        <p:blipFill>
-          <a:blip r:embed="rId4">
-            <a:extLst>
-              <a:ext uri="{28A0092B-C50C-407E-A947-70E740481C1C}">
-                <a14:useLocalDpi xmlns:a14="http://schemas.microsoft.com/office/drawing/2010/main" val="0"/>
-              </a:ext>
-            </a:extLst>
-          </a:blip>
-          <a:stretch>
-            <a:fillRect/>
-          </a:stretch>
-        </p:blipFill>
-        <p:spPr>
-          <a:xfrm>
-            <a:off x="1557045" y="1378428"/>
-            <a:ext cx="9077912" cy="4101144"/>
-          </a:xfrm>
-          <a:prstGeom prst="rect">
-            <a:avLst/>
-          </a:prstGeom>
-          <a:ln>
-            <a:solidFill>
-              <a:srgbClr val="000000"/>
-            </a:solidFill>
-          </a:ln>
-        </p:spPr>
-      </p:pic>
       <p:sp>
         <p:nvSpPr>
-          <p:cNvPr id="8" name="Alternate Process 7"/>
-          <p:cNvSpPr/>
-          <p:nvPr/>
+          <p:cNvPr id="2" name="Text Placeholder 1"/>
+          <p:cNvSpPr>
+            <a:spLocks noGrp="1"/>
+          </p:cNvSpPr>
+          <p:nvPr>
+            <p:ph type="body" idx="1"/>
+          </p:nvPr>
         </p:nvSpPr>
-        <p:spPr bwMode="auto">
-          <a:xfrm>
-            <a:off x="7216532" y="3877212"/>
-            <a:ext cx="2577221" cy="1400664"/>
-          </a:xfrm>
-          <a:prstGeom prst="flowChartAlternateProcess">
-            <a:avLst/>
-          </a:prstGeom>
-          <a:noFill/>
-          <a:ln w="38100">
-            <a:solidFill>
-              <a:srgbClr val="FF0000"/>
-            </a:solidFill>
-            <a:headEnd type="none" w="med" len="med"/>
-            <a:tailEnd type="none" w="med" len="med"/>
-          </a:ln>
-          <a:effectLst/>
-        </p:spPr>
-        <p:style>
-          <a:lnRef idx="1">
-            <a:schemeClr val="accent2"/>
-          </a:lnRef>
-          <a:fillRef idx="3">
-            <a:schemeClr val="accent2"/>
-          </a:fillRef>
-          <a:effectRef idx="2">
-            <a:schemeClr val="accent2"/>
-          </a:effectRef>
-          <a:fontRef idx="minor">
-            <a:schemeClr val="lt1"/>
-          </a:fontRef>
-        </p:style>
+        <p:spPr/>
         <p:txBody>
-          <a:bodyPr lIns="67232" tIns="67232" rIns="25215" bIns="25215" rtlCol="0" anchor="b" anchorCtr="0"/>
+          <a:bodyPr/>
           <a:lstStyle/>
           <a:p>
-            <a:pPr algn="ctr" defTabSz="685598"/>
-            <a:endParaRPr lang="en-US" sz="588" dirty="0">
-              <a:gradFill>
-                <a:gsLst>
-                  <a:gs pos="0">
-                    <a:srgbClr val="FFFFFF"/>
-                  </a:gs>
-                  <a:gs pos="100000">
-                    <a:srgbClr val="FFFFFF"/>
-                  </a:gs>
-                </a:gsLst>
-                <a:lin ang="5400000" scaled="0"/>
-              </a:gradFill>
-              <a:ea typeface="Segoe UI" pitchFamily="34" charset="0"/>
-              <a:cs typeface="Segoe UI" pitchFamily="34" charset="0"/>
-            </a:endParaRPr>
+            <a:endParaRPr lang="en-US"/>
           </a:p>
         </p:txBody>
       </p:sp>
     </p:spTree>
     <p:extLst>
       <p:ext uri="{BB962C8B-B14F-4D97-AF65-F5344CB8AC3E}">
-        <p14:creationId xmlns:p14="http://schemas.microsoft.com/office/powerpoint/2010/main" val="1918502651"/>
+        <p14:creationId xmlns:p14="http://schemas.microsoft.com/office/powerpoint/2010/main" val="1687926652"/>
       </p:ext>
     </p:extLst>
   </p:cSld>
@@ -17793,219 +17141,9 @@
   <p:timing>
     <p:tnLst>
       <p:par>
-        <p:cTn id="1" dur="indefinite" restart="never" nodeType="tmRoot">
-          <p:childTnLst>
-            <p:seq concurrent="1" nextAc="seek">
-              <p:cTn id="2" dur="indefinite" nodeType="mainSeq">
-                <p:childTnLst>
-                  <p:par>
-                    <p:cTn id="3" fill="hold">
-                      <p:stCondLst>
-                        <p:cond delay="indefinite"/>
-                        <p:cond evt="onBegin" delay="0">
-                          <p:tn val="2"/>
-                        </p:cond>
-                      </p:stCondLst>
-                      <p:childTnLst>
-                        <p:par>
-                          <p:cTn id="4" fill="hold">
-                            <p:stCondLst>
-                              <p:cond delay="0"/>
-                            </p:stCondLst>
-                            <p:childTnLst>
-                              <p:par>
-                                <p:cTn id="5" presetID="1" presetClass="entr" presetSubtype="0" fill="hold" nodeType="withEffect">
-                                  <p:stCondLst>
-                                    <p:cond delay="0"/>
-                                  </p:stCondLst>
-                                  <p:childTnLst>
-                                    <p:set>
-                                      <p:cBhvr>
-                                        <p:cTn id="6" dur="1" fill="hold">
-                                          <p:stCondLst>
-                                            <p:cond delay="0"/>
-                                          </p:stCondLst>
-                                        </p:cTn>
-                                        <p:tgtEl>
-                                          <p:spTgt spid="4"/>
-                                        </p:tgtEl>
-                                        <p:attrNameLst>
-                                          <p:attrName>style.visibility</p:attrName>
-                                        </p:attrNameLst>
-                                      </p:cBhvr>
-                                      <p:to>
-                                        <p:strVal val="visible"/>
-                                      </p:to>
-                                    </p:set>
-                                  </p:childTnLst>
-                                </p:cTn>
-                              </p:par>
-                            </p:childTnLst>
-                          </p:cTn>
-                        </p:par>
-                      </p:childTnLst>
-                    </p:cTn>
-                  </p:par>
-                  <p:par>
-                    <p:cTn id="7" fill="hold">
-                      <p:stCondLst>
-                        <p:cond delay="indefinite"/>
-                      </p:stCondLst>
-                      <p:childTnLst>
-                        <p:par>
-                          <p:cTn id="8" fill="hold">
-                            <p:stCondLst>
-                              <p:cond delay="0"/>
-                            </p:stCondLst>
-                            <p:childTnLst>
-                              <p:par>
-                                <p:cTn id="9" presetID="1" presetClass="entr" presetSubtype="0" fill="hold" grpId="0" nodeType="clickEffect">
-                                  <p:stCondLst>
-                                    <p:cond delay="0"/>
-                                  </p:stCondLst>
-                                  <p:childTnLst>
-                                    <p:set>
-                                      <p:cBhvr>
-                                        <p:cTn id="10" dur="1" fill="hold">
-                                          <p:stCondLst>
-                                            <p:cond delay="0"/>
-                                          </p:stCondLst>
-                                        </p:cTn>
-                                        <p:tgtEl>
-                                          <p:spTgt spid="5"/>
-                                        </p:tgtEl>
-                                        <p:attrNameLst>
-                                          <p:attrName>style.visibility</p:attrName>
-                                        </p:attrNameLst>
-                                      </p:cBhvr>
-                                      <p:to>
-                                        <p:strVal val="visible"/>
-                                      </p:to>
-                                    </p:set>
-                                  </p:childTnLst>
-                                </p:cTn>
-                              </p:par>
-                            </p:childTnLst>
-                          </p:cTn>
-                        </p:par>
-                      </p:childTnLst>
-                    </p:cTn>
-                  </p:par>
-                  <p:par>
-                    <p:cTn id="11" fill="hold">
-                      <p:stCondLst>
-                        <p:cond delay="indefinite"/>
-                      </p:stCondLst>
-                      <p:childTnLst>
-                        <p:par>
-                          <p:cTn id="12" fill="hold">
-                            <p:stCondLst>
-                              <p:cond delay="0"/>
-                            </p:stCondLst>
-                            <p:childTnLst>
-                              <p:par>
-                                <p:cTn id="13" presetID="1" presetClass="entr" presetSubtype="0" fill="hold" nodeType="clickEffect">
-                                  <p:stCondLst>
-                                    <p:cond delay="0"/>
-                                  </p:stCondLst>
-                                  <p:childTnLst>
-                                    <p:set>
-                                      <p:cBhvr>
-                                        <p:cTn id="14" dur="1" fill="hold">
-                                          <p:stCondLst>
-                                            <p:cond delay="0"/>
-                                          </p:stCondLst>
-                                        </p:cTn>
-                                        <p:tgtEl>
-                                          <p:spTgt spid="7"/>
-                                        </p:tgtEl>
-                                        <p:attrNameLst>
-                                          <p:attrName>style.visibility</p:attrName>
-                                        </p:attrNameLst>
-                                      </p:cBhvr>
-                                      <p:to>
-                                        <p:strVal val="visible"/>
-                                      </p:to>
-                                    </p:set>
-                                  </p:childTnLst>
-                                </p:cTn>
-                              </p:par>
-                            </p:childTnLst>
-                          </p:cTn>
-                        </p:par>
-                      </p:childTnLst>
-                    </p:cTn>
-                  </p:par>
-                  <p:par>
-                    <p:cTn id="15" fill="hold">
-                      <p:stCondLst>
-                        <p:cond delay="indefinite"/>
-                      </p:stCondLst>
-                      <p:childTnLst>
-                        <p:par>
-                          <p:cTn id="16" fill="hold">
-                            <p:stCondLst>
-                              <p:cond delay="0"/>
-                            </p:stCondLst>
-                            <p:childTnLst>
-                              <p:par>
-                                <p:cTn id="17" presetID="1" presetClass="entr" presetSubtype="0" fill="hold" grpId="0" nodeType="clickEffect">
-                                  <p:stCondLst>
-                                    <p:cond delay="0"/>
-                                  </p:stCondLst>
-                                  <p:childTnLst>
-                                    <p:set>
-                                      <p:cBhvr>
-                                        <p:cTn id="18" dur="1" fill="hold">
-                                          <p:stCondLst>
-                                            <p:cond delay="0"/>
-                                          </p:stCondLst>
-                                        </p:cTn>
-                                        <p:tgtEl>
-                                          <p:spTgt spid="8"/>
-                                        </p:tgtEl>
-                                        <p:attrNameLst>
-                                          <p:attrName>style.visibility</p:attrName>
-                                        </p:attrNameLst>
-                                      </p:cBhvr>
-                                      <p:to>
-                                        <p:strVal val="visible"/>
-                                      </p:to>
-                                    </p:set>
-                                  </p:childTnLst>
-                                </p:cTn>
-                              </p:par>
-                            </p:childTnLst>
-                          </p:cTn>
-                        </p:par>
-                      </p:childTnLst>
-                    </p:cTn>
-                  </p:par>
-                </p:childTnLst>
-              </p:cTn>
-              <p:prevCondLst>
-                <p:cond evt="onPrev" delay="0">
-                  <p:tgtEl>
-                    <p:sldTgt/>
-                  </p:tgtEl>
-                </p:cond>
-              </p:prevCondLst>
-              <p:nextCondLst>
-                <p:cond evt="onNext" delay="0">
-                  <p:tgtEl>
-                    <p:sldTgt/>
-                  </p:tgtEl>
-                </p:cond>
-              </p:nextCondLst>
-            </p:seq>
-          </p:childTnLst>
-        </p:cTn>
+        <p:cTn id="1" dur="indefinite" restart="never" nodeType="tmRoot"/>
       </p:par>
     </p:tnLst>
-    <p:bldLst>
-      <p:bldP spid="5" grpId="0" animBg="1"/>
-      <p:bldP spid="8" grpId="0" animBg="1"/>
-    </p:bldLst>
   </p:timing>
 </p:sld>
 </file>

</xml_diff>